<commit_message>
Adding in dissertation creation
</commit_message>
<xml_diff>
--- a/docs/content/presentations/packageSkeleton_Presentation.pptx
+++ b/docs/content/presentations/packageSkeleton_Presentation.pptx
@@ -23,6 +23,8 @@
     <p:sldId id="271" r:id="rId17"/>
     <p:sldId id="272" r:id="rId18"/>
     <p:sldId id="273" r:id="rId19"/>
+    <p:sldId id="274" r:id="rId20"/>
+    <p:sldId id="275" r:id="rId21"/>
   </p:sldIdLst>
   <p:sldSz cx="9144000" cy="5143500" type="screen16x9"/>
   <p:notesSz cx="6858000" cy="9144000"/>
@@ -3728,11 +3730,39 @@
           <a:lstStyle/>
           <a:p>
             <a:pPr lvl="0" indent="0" marL="0">
+              <a:spcBef>
+                <a:spcPts val="3000"/>
+              </a:spcBef>
               <a:buNone/>
             </a:pPr>
             <a:r>
-              <a:rPr/>
-              <a:t>FutureDirections</a:t>
+              <a:rPr b="1"/>
+              <a:t>Conclusion</a:t>
+            </a:r>
+          </a:p>
+          <a:p>
+            <a:pPr lvl="0"/>
+            <a:r>
+              <a:rPr b="1"/>
+              <a:t>packageSkeleton</a:t>
+            </a:r>
+            <a:r>
+              <a:rPr/>
+              <a:t> is a powerful starting point for R package development.</a:t>
+            </a:r>
+          </a:p>
+          <a:p>
+            <a:pPr lvl="0"/>
+            <a:r>
+              <a:rPr/>
+              <a:t>Use it to streamline your workflow, create well-documented R code, and publish it with a professional Quarto-powered website.</a:t>
+            </a:r>
+          </a:p>
+          <a:p>
+            <a:pPr lvl="0"/>
+            <a:r>
+              <a:rPr/>
+              <a:t>Leverage GitHub for collaboration, version control, and public distribution of your work.</a:t>
             </a:r>
           </a:p>
         </p:txBody>
@@ -3775,84 +3805,11 @@
           <a:lstStyle/>
           <a:p>
             <a:pPr lvl="0" indent="0" marL="0">
-              <a:spcBef>
-                <a:spcPts val="3000"/>
-              </a:spcBef>
               <a:buNone/>
             </a:pPr>
             <a:r>
-              <a:rPr b="1"/>
-              <a:t>Future Directions</a:t>
-            </a:r>
-          </a:p>
-          <a:p>
-            <a:pPr lvl="0"/>
-            <a:r>
-              <a:rPr b="1"/>
-              <a:t>NextJS Integration</a:t>
-            </a:r>
-            <a:r>
-              <a:rPr/>
-              <a:t>: Integrate packageSkeleton into NextJS framework to facilitate the development of a more robust and scalable data science development framework.</a:t>
-            </a:r>
-          </a:p>
-          <a:p>
-            <a:pPr lvl="0"/>
-            <a:r>
-              <a:rPr b="1"/>
-              <a:t>Web API Development</a:t>
-            </a:r>
-            <a:r>
-              <a:rPr/>
-              <a:t>: Expose analytics results as web APIs to be used by users as well as other applications.</a:t>
-            </a:r>
-          </a:p>
-          <a:p>
-            <a:pPr lvl="0"/>
-            <a:r>
-              <a:rPr b="1"/>
-              <a:t>MCP Integration</a:t>
-            </a:r>
-            <a:r>
-              <a:rPr/>
-              <a:t>: Utilize Model Context Protocol (MCP) to expose package tools and resources for integration with popular AI services.</a:t>
-            </a:r>
-          </a:p>
-          <a:p>
-            <a:pPr lvl="0" indent="0" marL="0">
-              <a:spcBef>
-                <a:spcPts val="3000"/>
-              </a:spcBef>
-              <a:buNone/>
-            </a:pPr>
-            <a:r>
-              <a:rPr b="1"/>
-              <a:t>Conclusion</a:t>
-            </a:r>
-          </a:p>
-          <a:p>
-            <a:pPr lvl="0"/>
-            <a:r>
-              <a:rPr b="1"/>
-              <a:t>packageSkeleton</a:t>
-            </a:r>
-            <a:r>
-              <a:rPr/>
-              <a:t> is a powerful starting point for R package development.</a:t>
-            </a:r>
-          </a:p>
-          <a:p>
-            <a:pPr lvl="0"/>
-            <a:r>
-              <a:rPr/>
-              <a:t>Use it to streamline your workflow, create well-documented R code, and publish it with a professional Quarto-powered website.</a:t>
-            </a:r>
-          </a:p>
-          <a:p>
-            <a:pPr lvl="0"/>
-            <a:r>
-              <a:rPr/>
-              <a:t>Leverage GitHub for collaboration, version control, and public distribution of your work.</a:t>
+              <a:rPr/>
+              <a:t>FutureDirections</a:t>
             </a:r>
           </a:p>
         </p:txBody>
@@ -3902,34 +3859,40 @@
             </a:pPr>
             <a:r>
               <a:rPr b="1"/>
-              <a:t>Further Resources</a:t>
+              <a:t>Future Directions</a:t>
             </a:r>
           </a:p>
           <a:p>
             <a:pPr lvl="0"/>
             <a:r>
-              <a:rPr>
-                <a:hlinkClick r:id="rId2"/>
-              </a:rPr>
-              <a:t>Quarto Documentation</a:t>
+              <a:rPr b="1"/>
+              <a:t>NextJS Integration</a:t>
+            </a:r>
+            <a:r>
+              <a:rPr/>
+              <a:t>: Integrate packageSkeleton into NextJS framework to facilitate the development of a more robust and scalable data science development framework.</a:t>
             </a:r>
           </a:p>
           <a:p>
             <a:pPr lvl="0"/>
             <a:r>
-              <a:rPr>
-                <a:hlinkClick r:id="rId3"/>
-              </a:rPr>
-              <a:t>R Package Development</a:t>
+              <a:rPr b="1"/>
+              <a:t>Web API Development</a:t>
+            </a:r>
+            <a:r>
+              <a:rPr/>
+              <a:t>: Expose analytics results as web APIs to be used by users as well as other applications.</a:t>
             </a:r>
           </a:p>
           <a:p>
             <a:pPr lvl="0"/>
             <a:r>
-              <a:rPr>
-                <a:hlinkClick r:id="rId4"/>
-              </a:rPr>
-              <a:t>GitHub Pages</a:t>
+              <a:rPr b="1"/>
+              <a:t>MCP Integration</a:t>
+            </a:r>
+            <a:r>
+              <a:rPr/>
+              <a:t>: Utilize Model Context Protocol (MCP) to expose package tools and resources for integration with popular AI services.</a:t>
             </a:r>
           </a:p>
         </p:txBody>
@@ -3956,36 +3919,108 @@
           <a:chExt cx="0" cy="0"/>
         </a:xfrm>
       </p:grpSpPr>
-      <p:pic>
-        <p:nvPicPr>
-          <p:cNvPr descr="assets/img/qr_code.png" id="0" name="Picture 1"/>
-          <p:cNvPicPr>
-            <a:picLocks noGrp="1" noChangeAspect="1"/>
-          </p:cNvPicPr>
-          <p:nvPr/>
-        </p:nvPicPr>
-        <p:blipFill>
-          <a:blip r:embed="rId2"/>
-          <a:stretch>
-            <a:fillRect/>
-          </a:stretch>
-        </p:blipFill>
-        <p:spPr bwMode="auto">
-          <a:xfrm>
-            <a:off x="2870200" y="1193800"/>
-            <a:ext cx="3390900" cy="3390900"/>
-          </a:xfrm>
-          <a:prstGeom prst="rect">
-            <a:avLst/>
-          </a:prstGeom>
-          <a:noFill/>
-          <a:ln w="9525">
-            <a:noFill/>
-            <a:headEnd/>
-            <a:tailEnd/>
-          </a:ln>
-        </p:spPr>
-      </p:pic>
+      <p:sp>
+        <p:nvSpPr>
+          <p:cNvPr id="3" name="Content Placeholder 2"/>
+          <p:cNvSpPr>
+            <a:spLocks noGrp="1"/>
+          </p:cNvSpPr>
+          <p:nvPr>
+            <p:ph idx="1"/>
+          </p:nvPr>
+        </p:nvSpPr>
+        <p:spPr/>
+        <p:txBody>
+          <a:bodyPr/>
+          <a:lstStyle/>
+          <a:p>
+            <a:pPr lvl="0" indent="0" marL="0">
+              <a:buNone/>
+            </a:pPr>
+            <a:r>
+              <a:rPr/>
+              <a:t>Resources</a:t>
+            </a:r>
+          </a:p>
+        </p:txBody>
+      </p:sp>
+    </p:spTree>
+  </p:cSld>
+</p:sld>
+</file>
+
+<file path=ppt/slides/slide19.xml><?xml version="1.0" encoding="utf-8"?>
+<p:sld xmlns:a="http://schemas.openxmlformats.org/drawingml/2006/main" xmlns:r="http://schemas.openxmlformats.org/officeDocument/2006/relationships" xmlns:p="http://schemas.openxmlformats.org/presentationml/2006/main">
+  <p:cSld>
+    <p:spTree>
+      <p:nvGrpSpPr>
+        <p:cNvPr id="1" name=""/>
+        <p:cNvGrpSpPr/>
+        <p:nvPr/>
+      </p:nvGrpSpPr>
+      <p:grpSpPr>
+        <a:xfrm>
+          <a:off x="0" y="0"/>
+          <a:ext cx="0" cy="0"/>
+          <a:chOff x="0" y="0"/>
+          <a:chExt cx="0" cy="0"/>
+        </a:xfrm>
+      </p:grpSpPr>
+      <p:sp>
+        <p:nvSpPr>
+          <p:cNvPr id="3" name="Content Placeholder 2"/>
+          <p:cNvSpPr>
+            <a:spLocks noGrp="1"/>
+          </p:cNvSpPr>
+          <p:nvPr>
+            <p:ph idx="1"/>
+          </p:nvPr>
+        </p:nvSpPr>
+        <p:spPr/>
+        <p:txBody>
+          <a:bodyPr/>
+          <a:lstStyle/>
+          <a:p>
+            <a:pPr lvl="0" indent="0" marL="0">
+              <a:spcBef>
+                <a:spcPts val="3000"/>
+              </a:spcBef>
+              <a:buNone/>
+            </a:pPr>
+            <a:r>
+              <a:rPr b="1"/>
+              <a:t>Resources</a:t>
+            </a:r>
+          </a:p>
+          <a:p>
+            <a:pPr lvl="0"/>
+            <a:r>
+              <a:rPr>
+                <a:hlinkClick r:id="rId2"/>
+              </a:rPr>
+              <a:t>Quarto Documentation</a:t>
+            </a:r>
+          </a:p>
+          <a:p>
+            <a:pPr lvl="0"/>
+            <a:r>
+              <a:rPr>
+                <a:hlinkClick r:id="rId3"/>
+              </a:rPr>
+              <a:t>R Package Development</a:t>
+            </a:r>
+          </a:p>
+          <a:p>
+            <a:pPr lvl="0"/>
+            <a:r>
+              <a:rPr>
+                <a:hlinkClick r:id="rId4"/>
+              </a:rPr>
+              <a:t>GitHub Pages</a:t>
+            </a:r>
+          </a:p>
+        </p:txBody>
+      </p:sp>
     </p:spTree>
   </p:cSld>
 </p:sld>
@@ -4093,6 +4128,86 @@
           </a:p>
         </p:txBody>
       </p:sp>
+    </p:spTree>
+  </p:cSld>
+</p:sld>
+</file>
+
+<file path=ppt/slides/slide20.xml><?xml version="1.0" encoding="utf-8"?>
+<p:sld xmlns:a="http://schemas.openxmlformats.org/drawingml/2006/main" xmlns:r="http://schemas.openxmlformats.org/officeDocument/2006/relationships" xmlns:p="http://schemas.openxmlformats.org/presentationml/2006/main">
+  <p:cSld>
+    <p:spTree>
+      <p:nvGrpSpPr>
+        <p:cNvPr id="1" name=""/>
+        <p:cNvGrpSpPr/>
+        <p:nvPr/>
+      </p:nvGrpSpPr>
+      <p:grpSpPr>
+        <a:xfrm>
+          <a:off x="0" y="0"/>
+          <a:ext cx="0" cy="0"/>
+          <a:chOff x="0" y="0"/>
+          <a:chExt cx="0" cy="0"/>
+        </a:xfrm>
+      </p:grpSpPr>
+      <p:sp>
+        <p:nvSpPr>
+          <p:cNvPr id="4" name="Text Placeholder 3"/>
+          <p:cNvSpPr>
+            <a:spLocks noGrp="1"/>
+          </p:cNvSpPr>
+          <p:nvPr>
+            <p:ph idx="2" sz="half" type="body"/>
+          </p:nvPr>
+        </p:nvSpPr>
+        <p:spPr/>
+        <p:txBody>
+          <a:bodyPr/>
+          <a:lstStyle/>
+          <a:p>
+            <a:pPr lvl="0" indent="0" marL="0">
+              <a:spcBef>
+                <a:spcPts val="3000"/>
+              </a:spcBef>
+              <a:buNone/>
+            </a:pPr>
+            <a:r>
+              <a:rPr b="1"/>
+              <a:t>For the Presentation</a:t>
+            </a:r>
+          </a:p>
+        </p:txBody>
+      </p:sp>
+      <p:pic>
+        <p:nvPicPr>
+          <p:cNvPr descr="assets/img/qr_code.png" id="0" name="Picture 1"/>
+          <p:cNvPicPr>
+            <a:picLocks noGrp="1" noChangeAspect="1"/>
+          </p:cNvPicPr>
+          <p:nvPr/>
+        </p:nvPicPr>
+        <p:blipFill>
+          <a:blip r:embed="rId2"/>
+          <a:stretch>
+            <a:fillRect/>
+          </a:stretch>
+        </p:blipFill>
+        <p:spPr bwMode="auto">
+          <a:xfrm>
+            <a:off x="3937000" y="203200"/>
+            <a:ext cx="4381500" cy="4381500"/>
+          </a:xfrm>
+          <a:prstGeom prst="rect">
+            <a:avLst/>
+          </a:prstGeom>
+          <a:noFill/>
+          <a:ln w="9525">
+            <a:noFill/>
+            <a:headEnd/>
+            <a:tailEnd/>
+          </a:ln>
+        </p:spPr>
+      </p:pic>
     </p:spTree>
   </p:cSld>
 </p:sld>

</xml_diff>